<commit_message>
Update README.md with case presentation details
</commit_message>
<xml_diff>
--- a/Case Tecnologia.pptx
+++ b/Case Tecnologia.pptx
@@ -5,7 +5,7 @@
     <p:sldMasterId id="2147484173" r:id="rId1"/>
   </p:sldMasterIdLst>
   <p:notesMasterIdLst>
-    <p:notesMasterId r:id="rId18"/>
+    <p:notesMasterId r:id="rId12"/>
   </p:notesMasterIdLst>
   <p:sldIdLst>
     <p:sldId id="256" r:id="rId2"/>
@@ -15,15 +15,9 @@
     <p:sldId id="264" r:id="rId6"/>
     <p:sldId id="271" r:id="rId7"/>
     <p:sldId id="261" r:id="rId8"/>
-    <p:sldId id="267" r:id="rId9"/>
-    <p:sldId id="268" r:id="rId10"/>
-    <p:sldId id="269" r:id="rId11"/>
-    <p:sldId id="270" r:id="rId12"/>
-    <p:sldId id="274" r:id="rId13"/>
-    <p:sldId id="273" r:id="rId14"/>
-    <p:sldId id="272" r:id="rId15"/>
-    <p:sldId id="260" r:id="rId16"/>
-    <p:sldId id="263" r:id="rId17"/>
+    <p:sldId id="272" r:id="rId9"/>
+    <p:sldId id="260" r:id="rId10"/>
+    <p:sldId id="263" r:id="rId11"/>
   </p:sldIdLst>
   <p:sldSz cx="12192000" cy="6858000"/>
   <p:notesSz cx="6858000" cy="9144000"/>
@@ -8846,16 +8840,7 @@
           <a:bodyPr/>
           <a:lstStyle/>
           <a:p>
-            <a:r>
-              <a:rPr lang="pt-BR" dirty="0"/>
-              <a:t>Objetivo: conhecer melhor os dados para ter uma analise mais ágil que te proporcione diminuição de custos e aumento de faturamento.</a:t>
-            </a:r>
-          </a:p>
-          <a:p>
-            <a:r>
-              <a:rPr lang="pt-BR" dirty="0"/>
-              <a:t>Oportunidade: melhoria no seu pipeline de analise de dados. </a:t>
-            </a:r>
+            <a:endParaRPr lang="pt-BR" dirty="0"/>
           </a:p>
         </p:txBody>
       </p:sp>
@@ -8876,7 +8861,7 @@
           <a:p>
             <a:fld id="{ECDA99A7-A154-4F25-A885-C77144BF4F10}" type="slidenum">
               <a:rPr lang="pt-BR" smtClean="0"/>
-              <a:t>2</a:t>
+              <a:t>1</a:t>
             </a:fld>
             <a:endParaRPr lang="pt-BR"/>
           </a:p>
@@ -8885,91 +8870,7 @@
     </p:spTree>
     <p:extLst>
       <p:ext uri="{BB962C8B-B14F-4D97-AF65-F5344CB8AC3E}">
-        <p14:creationId xmlns:p14="http://schemas.microsoft.com/office/powerpoint/2010/main" val="2264656176"/>
-      </p:ext>
-    </p:extLst>
-  </p:cSld>
-  <p:clrMapOvr>
-    <a:masterClrMapping/>
-  </p:clrMapOvr>
-</p:notes>
-</file>
-
-<file path=ppt/notesSlides/notesSlide10.xml><?xml version="1.0" encoding="utf-8"?>
-<p:notes xmlns:a="http://schemas.openxmlformats.org/drawingml/2006/main" xmlns:r="http://schemas.openxmlformats.org/officeDocument/2006/relationships" xmlns:p="http://schemas.openxmlformats.org/presentationml/2006/main">
-  <p:cSld>
-    <p:spTree>
-      <p:nvGrpSpPr>
-        <p:cNvPr id="1" name=""/>
-        <p:cNvGrpSpPr/>
-        <p:nvPr/>
-      </p:nvGrpSpPr>
-      <p:grpSpPr>
-        <a:xfrm>
-          <a:off x="0" y="0"/>
-          <a:ext cx="0" cy="0"/>
-          <a:chOff x="0" y="0"/>
-          <a:chExt cx="0" cy="0"/>
-        </a:xfrm>
-      </p:grpSpPr>
-      <p:sp>
-        <p:nvSpPr>
-          <p:cNvPr id="2" name="Espaço Reservado para Imagem de Slide 1"/>
-          <p:cNvSpPr>
-            <a:spLocks noGrp="1" noRot="1" noChangeAspect="1"/>
-          </p:cNvSpPr>
-          <p:nvPr>
-            <p:ph type="sldImg"/>
-          </p:nvPr>
-        </p:nvSpPr>
-        <p:spPr/>
-      </p:sp>
-      <p:sp>
-        <p:nvSpPr>
-          <p:cNvPr id="3" name="Espaço Reservado para Anotações 2"/>
-          <p:cNvSpPr>
-            <a:spLocks noGrp="1"/>
-          </p:cNvSpPr>
-          <p:nvPr>
-            <p:ph type="body" idx="1"/>
-          </p:nvPr>
-        </p:nvSpPr>
-        <p:spPr/>
-        <p:txBody>
-          <a:bodyPr/>
-          <a:lstStyle/>
-          <a:p>
-            <a:endParaRPr lang="pt-BR" dirty="0"/>
-          </a:p>
-        </p:txBody>
-      </p:sp>
-      <p:sp>
-        <p:nvSpPr>
-          <p:cNvPr id="4" name="Espaço Reservado para Número de Slide 3"/>
-          <p:cNvSpPr>
-            <a:spLocks noGrp="1"/>
-          </p:cNvSpPr>
-          <p:nvPr>
-            <p:ph type="sldNum" sz="quarter" idx="5"/>
-          </p:nvPr>
-        </p:nvSpPr>
-        <p:spPr/>
-        <p:txBody>
-          <a:bodyPr/>
-          <a:lstStyle/>
-          <a:p>
-            <a:fld id="{ECDA99A7-A154-4F25-A885-C77144BF4F10}" type="slidenum">
-              <a:rPr lang="pt-BR" smtClean="0"/>
-              <a:t>16</a:t>
-            </a:fld>
-            <a:endParaRPr lang="pt-BR"/>
-          </a:p>
-        </p:txBody>
-      </p:sp>
-    </p:spTree>
-    <p:extLst>
-      <p:ext uri="{BB962C8B-B14F-4D97-AF65-F5344CB8AC3E}">
-        <p14:creationId xmlns:p14="http://schemas.microsoft.com/office/powerpoint/2010/main" val="1735062022"/>
+        <p14:creationId xmlns:p14="http://schemas.microsoft.com/office/powerpoint/2010/main" val="1335703052"/>
       </p:ext>
     </p:extLst>
   </p:cSld>
@@ -9025,50 +8926,13 @@
           <a:p>
             <a:r>
               <a:rPr lang="pt-BR" dirty="0"/>
-              <a:t>Complexidade: pipeline integrado e UI consistente</a:t>
+              <a:t>Objetivo: conhecer melhor os dados para ter uma analise mais ágil que te proporcione diminuição de custos e aumento de faturamento.</a:t>
             </a:r>
           </a:p>
           <a:p>
             <a:r>
               <a:rPr lang="pt-BR" dirty="0"/>
-              <a:t>Carga de trabalho: menor necessidade de profissionais especializados e </a:t>
-            </a:r>
-            <a:r>
-              <a:rPr lang="pt-BR" dirty="0" err="1"/>
-              <a:t>infraestrtura</a:t>
-            </a:r>
-            <a:r>
-              <a:rPr lang="pt-BR" dirty="0"/>
-              <a:t> e facilidade de desenvolvimento</a:t>
-            </a:r>
-          </a:p>
-          <a:p>
-            <a:r>
-              <a:rPr lang="pt-BR" dirty="0"/>
-              <a:t>Custos: menos pessoal e trabalho mais rápido, igual custo menor </a:t>
-            </a:r>
-          </a:p>
-          <a:p>
-            <a:r>
-              <a:rPr lang="pt-BR" dirty="0"/>
-              <a:t>Simplicidade: plataforma simples e intuitiva e </a:t>
-            </a:r>
-            <a:r>
-              <a:rPr lang="pt-BR" dirty="0" err="1"/>
-              <a:t>poderos</a:t>
-            </a:r>
-            <a:endParaRPr lang="pt-BR" dirty="0"/>
-          </a:p>
-          <a:p>
-            <a:r>
-              <a:rPr lang="pt-BR" dirty="0"/>
-              <a:t>Eficiência: tem UI consistente e tem todas as ferramentas que o colaborador precisa </a:t>
-            </a:r>
-          </a:p>
-          <a:p>
-            <a:r>
-              <a:rPr lang="pt-BR" dirty="0"/>
-              <a:t>Retorno sobre investimento: mais rápido, maior que as alternativas</a:t>
+              <a:t>Oportunidade: melhoria no seu pipeline de analise de dados. </a:t>
             </a:r>
           </a:p>
         </p:txBody>
@@ -9090,7 +8954,7 @@
           <a:p>
             <a:fld id="{ECDA99A7-A154-4F25-A885-C77144BF4F10}" type="slidenum">
               <a:rPr lang="pt-BR" smtClean="0"/>
-              <a:t>3</a:t>
+              <a:t>2</a:t>
             </a:fld>
             <a:endParaRPr lang="pt-BR"/>
           </a:p>
@@ -9099,7 +8963,7 @@
     </p:spTree>
     <p:extLst>
       <p:ext uri="{BB962C8B-B14F-4D97-AF65-F5344CB8AC3E}">
-        <p14:creationId xmlns:p14="http://schemas.microsoft.com/office/powerpoint/2010/main" val="944434900"/>
+        <p14:creationId xmlns:p14="http://schemas.microsoft.com/office/powerpoint/2010/main" val="2264656176"/>
       </p:ext>
     </p:extLst>
   </p:cSld>
@@ -9154,36 +9018,52 @@
           <a:lstStyle/>
           <a:p>
             <a:r>
-              <a:rPr lang="pt-BR" b="0" i="0" dirty="0">
-                <a:solidFill>
-                  <a:srgbClr val="FFFFFF"/>
-                </a:solidFill>
-                <a:effectLst/>
-                <a:latin typeface="system-ui"/>
-              </a:rPr>
-              <a:t>A </a:t>
+              <a:rPr lang="pt-BR" dirty="0"/>
+              <a:t>Complexidade: pipeline integrado e UI consistente</a:t>
+            </a:r>
+          </a:p>
+          <a:p>
+            <a:r>
+              <a:rPr lang="pt-BR" dirty="0"/>
+              <a:t>Carga de trabalho: menor necessidade de profissionais especializados e </a:t>
             </a:r>
             <a:r>
-              <a:rPr lang="pt-BR" b="1" i="0" dirty="0">
-                <a:solidFill>
-                  <a:srgbClr val="FFFFFF"/>
-                </a:solidFill>
-                <a:effectLst/>
-                <a:latin typeface="system-ui"/>
-              </a:rPr>
-              <a:t>Plataforma de Dados</a:t>
+              <a:rPr lang="pt-BR" dirty="0" err="1"/>
+              <a:t>infraestrtura</a:t>
             </a:r>
             <a:r>
-              <a:rPr lang="pt-BR" b="0" i="0" dirty="0">
-                <a:solidFill>
-                  <a:srgbClr val="FFFFFF"/>
-                </a:solidFill>
-                <a:effectLst/>
-                <a:latin typeface="system-ui"/>
-              </a:rPr>
-              <a:t> integra etapas de Coleta, Processamento, Exploração e Análise, toda a jornada apoiada em uma gestão de acesso que promove a governança dos dados da sua organização e entrega aplicativos para o negócio, tudo isso sem depender de um time de dados especializado.</a:t>
+              <a:rPr lang="pt-BR" dirty="0"/>
+              <a:t> e facilidade de desenvolvimento</a:t>
+            </a:r>
+          </a:p>
+          <a:p>
+            <a:r>
+              <a:rPr lang="pt-BR" dirty="0"/>
+              <a:t>Custos: menos pessoal e trabalho mais rápido, igual custo menor </a:t>
+            </a:r>
+          </a:p>
+          <a:p>
+            <a:r>
+              <a:rPr lang="pt-BR" dirty="0"/>
+              <a:t>Simplicidade: plataforma simples e intuitiva e </a:t>
+            </a:r>
+            <a:r>
+              <a:rPr lang="pt-BR" dirty="0" err="1"/>
+              <a:t>poderos</a:t>
             </a:r>
             <a:endParaRPr lang="pt-BR" dirty="0"/>
+          </a:p>
+          <a:p>
+            <a:r>
+              <a:rPr lang="pt-BR" dirty="0"/>
+              <a:t>Eficiência: tem UI consistente e tem todas as ferramentas que o colaborador precisa </a:t>
+            </a:r>
+          </a:p>
+          <a:p>
+            <a:r>
+              <a:rPr lang="pt-BR" dirty="0"/>
+              <a:t>Retorno sobre investimento: mais rápido, maior que as alternativas</a:t>
+            </a:r>
           </a:p>
         </p:txBody>
       </p:sp>
@@ -9204,7 +9084,7 @@
           <a:p>
             <a:fld id="{ECDA99A7-A154-4F25-A885-C77144BF4F10}" type="slidenum">
               <a:rPr lang="pt-BR" smtClean="0"/>
-              <a:t>4</a:t>
+              <a:t>3</a:t>
             </a:fld>
             <a:endParaRPr lang="pt-BR"/>
           </a:p>
@@ -9213,7 +9093,7 @@
     </p:spTree>
     <p:extLst>
       <p:ext uri="{BB962C8B-B14F-4D97-AF65-F5344CB8AC3E}">
-        <p14:creationId xmlns:p14="http://schemas.microsoft.com/office/powerpoint/2010/main" val="2943867865"/>
+        <p14:creationId xmlns:p14="http://schemas.microsoft.com/office/powerpoint/2010/main" val="944434900"/>
       </p:ext>
     </p:extLst>
   </p:cSld>
@@ -9268,9 +9148,36 @@
           <a:lstStyle/>
           <a:p>
             <a:r>
-              <a:rPr lang="pt-BR" dirty="0"/>
-              <a:t>Objetivo: é da POC é fazer uma demonstração do que nós podemos fazer pela sua empresa. Aqui nós temos um exemplo, uma prova de conceito, que responde perguntas sobre o seu negócio. </a:t>
+              <a:rPr lang="pt-BR" b="0" i="0" dirty="0">
+                <a:solidFill>
+                  <a:srgbClr val="FFFFFF"/>
+                </a:solidFill>
+                <a:effectLst/>
+                <a:latin typeface="system-ui"/>
+              </a:rPr>
+              <a:t>A </a:t>
             </a:r>
+            <a:r>
+              <a:rPr lang="pt-BR" b="1" i="0" dirty="0">
+                <a:solidFill>
+                  <a:srgbClr val="FFFFFF"/>
+                </a:solidFill>
+                <a:effectLst/>
+                <a:latin typeface="system-ui"/>
+              </a:rPr>
+              <a:t>Plataforma de Dados</a:t>
+            </a:r>
+            <a:r>
+              <a:rPr lang="pt-BR" b="0" i="0" dirty="0">
+                <a:solidFill>
+                  <a:srgbClr val="FFFFFF"/>
+                </a:solidFill>
+                <a:effectLst/>
+                <a:latin typeface="system-ui"/>
+              </a:rPr>
+              <a:t> integra etapas de Coleta, Processamento, Exploração e Análise, toda a jornada apoiada em uma gestão de acesso que promove a governança dos dados da sua organização e entrega aplicativos para o negócio, tudo isso sem depender de um time de dados especializado.</a:t>
+            </a:r>
+            <a:endParaRPr lang="pt-BR" dirty="0"/>
           </a:p>
         </p:txBody>
       </p:sp>
@@ -9291,7 +9198,7 @@
           <a:p>
             <a:fld id="{ECDA99A7-A154-4F25-A885-C77144BF4F10}" type="slidenum">
               <a:rPr lang="pt-BR" smtClean="0"/>
-              <a:t>5</a:t>
+              <a:t>4</a:t>
             </a:fld>
             <a:endParaRPr lang="pt-BR"/>
           </a:p>
@@ -9300,7 +9207,7 @@
     </p:spTree>
     <p:extLst>
       <p:ext uri="{BB962C8B-B14F-4D97-AF65-F5344CB8AC3E}">
-        <p14:creationId xmlns:p14="http://schemas.microsoft.com/office/powerpoint/2010/main" val="1802341222"/>
+        <p14:creationId xmlns:p14="http://schemas.microsoft.com/office/powerpoint/2010/main" val="2943867865"/>
       </p:ext>
     </p:extLst>
   </p:cSld>
@@ -9354,7 +9261,10 @@
           <a:bodyPr/>
           <a:lstStyle/>
           <a:p>
-            <a:endParaRPr lang="pt-BR" dirty="0"/>
+            <a:r>
+              <a:rPr lang="pt-BR" dirty="0"/>
+              <a:t>Objetivo: é da POC é fazer uma demonstração do que nós podemos fazer pela sua empresa. Aqui nós temos um exemplo, uma prova de conceito, que responde perguntas sobre o seu negócio. </a:t>
+            </a:r>
           </a:p>
         </p:txBody>
       </p:sp>
@@ -9375,7 +9285,7 @@
           <a:p>
             <a:fld id="{ECDA99A7-A154-4F25-A885-C77144BF4F10}" type="slidenum">
               <a:rPr lang="pt-BR" smtClean="0"/>
-              <a:t>7</a:t>
+              <a:t>5</a:t>
             </a:fld>
             <a:endParaRPr lang="pt-BR"/>
           </a:p>
@@ -9384,7 +9294,7 @@
     </p:spTree>
     <p:extLst>
       <p:ext uri="{BB962C8B-B14F-4D97-AF65-F5344CB8AC3E}">
-        <p14:creationId xmlns:p14="http://schemas.microsoft.com/office/powerpoint/2010/main" val="77089032"/>
+        <p14:creationId xmlns:p14="http://schemas.microsoft.com/office/powerpoint/2010/main" val="1802341222"/>
       </p:ext>
     </p:extLst>
   </p:cSld>
@@ -9459,7 +9369,7 @@
           <a:p>
             <a:fld id="{ECDA99A7-A154-4F25-A885-C77144BF4F10}" type="slidenum">
               <a:rPr lang="pt-BR" smtClean="0"/>
-              <a:t>11</a:t>
+              <a:t>7</a:t>
             </a:fld>
             <a:endParaRPr lang="pt-BR"/>
           </a:p>
@@ -9468,7 +9378,7 @@
     </p:spTree>
     <p:extLst>
       <p:ext uri="{BB962C8B-B14F-4D97-AF65-F5344CB8AC3E}">
-        <p14:creationId xmlns:p14="http://schemas.microsoft.com/office/powerpoint/2010/main" val="3491635802"/>
+        <p14:creationId xmlns:p14="http://schemas.microsoft.com/office/powerpoint/2010/main" val="77089032"/>
       </p:ext>
     </p:extLst>
   </p:cSld>
@@ -9543,7 +9453,7 @@
           <a:p>
             <a:fld id="{ECDA99A7-A154-4F25-A885-C77144BF4F10}" type="slidenum">
               <a:rPr lang="pt-BR" smtClean="0"/>
-              <a:t>12</a:t>
+              <a:t>9</a:t>
             </a:fld>
             <a:endParaRPr lang="pt-BR"/>
           </a:p>
@@ -9552,7 +9462,7 @@
     </p:spTree>
     <p:extLst>
       <p:ext uri="{BB962C8B-B14F-4D97-AF65-F5344CB8AC3E}">
-        <p14:creationId xmlns:p14="http://schemas.microsoft.com/office/powerpoint/2010/main" val="3597440854"/>
+        <p14:creationId xmlns:p14="http://schemas.microsoft.com/office/powerpoint/2010/main" val="1198747514"/>
       </p:ext>
     </p:extLst>
   </p:cSld>
@@ -9627,7 +9537,7 @@
           <a:p>
             <a:fld id="{ECDA99A7-A154-4F25-A885-C77144BF4F10}" type="slidenum">
               <a:rPr lang="pt-BR" smtClean="0"/>
-              <a:t>13</a:t>
+              <a:t>10</a:t>
             </a:fld>
             <a:endParaRPr lang="pt-BR"/>
           </a:p>
@@ -9636,91 +9546,7 @@
     </p:spTree>
     <p:extLst>
       <p:ext uri="{BB962C8B-B14F-4D97-AF65-F5344CB8AC3E}">
-        <p14:creationId xmlns:p14="http://schemas.microsoft.com/office/powerpoint/2010/main" val="2678716311"/>
-      </p:ext>
-    </p:extLst>
-  </p:cSld>
-  <p:clrMapOvr>
-    <a:masterClrMapping/>
-  </p:clrMapOvr>
-</p:notes>
-</file>
-
-<file path=ppt/notesSlides/notesSlide9.xml><?xml version="1.0" encoding="utf-8"?>
-<p:notes xmlns:a="http://schemas.openxmlformats.org/drawingml/2006/main" xmlns:r="http://schemas.openxmlformats.org/officeDocument/2006/relationships" xmlns:p="http://schemas.openxmlformats.org/presentationml/2006/main">
-  <p:cSld>
-    <p:spTree>
-      <p:nvGrpSpPr>
-        <p:cNvPr id="1" name=""/>
-        <p:cNvGrpSpPr/>
-        <p:nvPr/>
-      </p:nvGrpSpPr>
-      <p:grpSpPr>
-        <a:xfrm>
-          <a:off x="0" y="0"/>
-          <a:ext cx="0" cy="0"/>
-          <a:chOff x="0" y="0"/>
-          <a:chExt cx="0" cy="0"/>
-        </a:xfrm>
-      </p:grpSpPr>
-      <p:sp>
-        <p:nvSpPr>
-          <p:cNvPr id="2" name="Espaço Reservado para Imagem de Slide 1"/>
-          <p:cNvSpPr>
-            <a:spLocks noGrp="1" noRot="1" noChangeAspect="1"/>
-          </p:cNvSpPr>
-          <p:nvPr>
-            <p:ph type="sldImg"/>
-          </p:nvPr>
-        </p:nvSpPr>
-        <p:spPr/>
-      </p:sp>
-      <p:sp>
-        <p:nvSpPr>
-          <p:cNvPr id="3" name="Espaço Reservado para Anotações 2"/>
-          <p:cNvSpPr>
-            <a:spLocks noGrp="1"/>
-          </p:cNvSpPr>
-          <p:nvPr>
-            <p:ph type="body" idx="1"/>
-          </p:nvPr>
-        </p:nvSpPr>
-        <p:spPr/>
-        <p:txBody>
-          <a:bodyPr/>
-          <a:lstStyle/>
-          <a:p>
-            <a:endParaRPr lang="pt-BR" dirty="0"/>
-          </a:p>
-        </p:txBody>
-      </p:sp>
-      <p:sp>
-        <p:nvSpPr>
-          <p:cNvPr id="4" name="Espaço Reservado para Número de Slide 3"/>
-          <p:cNvSpPr>
-            <a:spLocks noGrp="1"/>
-          </p:cNvSpPr>
-          <p:nvPr>
-            <p:ph type="sldNum" sz="quarter" idx="5"/>
-          </p:nvPr>
-        </p:nvSpPr>
-        <p:spPr/>
-        <p:txBody>
-          <a:bodyPr/>
-          <a:lstStyle/>
-          <a:p>
-            <a:fld id="{ECDA99A7-A154-4F25-A885-C77144BF4F10}" type="slidenum">
-              <a:rPr lang="pt-BR" smtClean="0"/>
-              <a:t>15</a:t>
-            </a:fld>
-            <a:endParaRPr lang="pt-BR"/>
-          </a:p>
-        </p:txBody>
-      </p:sp>
-    </p:spTree>
-    <p:extLst>
-      <p:ext uri="{BB962C8B-B14F-4D97-AF65-F5344CB8AC3E}">
-        <p14:creationId xmlns:p14="http://schemas.microsoft.com/office/powerpoint/2010/main" val="1198747514"/>
+        <p14:creationId xmlns:p14="http://schemas.microsoft.com/office/powerpoint/2010/main" val="1735062022"/>
       </p:ext>
     </p:extLst>
   </p:cSld>
@@ -13543,617 +13369,6 @@
           <p:cNvPr id="2" name="Título 1">
             <a:extLst>
               <a:ext uri="{FF2B5EF4-FFF2-40B4-BE49-F238E27FC236}">
-                <a16:creationId xmlns:a16="http://schemas.microsoft.com/office/drawing/2014/main" id="{07849ED2-EA9A-3D76-5D81-36B6B0CEB2D6}"/>
-              </a:ext>
-            </a:extLst>
-          </p:cNvPr>
-          <p:cNvSpPr>
-            <a:spLocks noGrp="1"/>
-          </p:cNvSpPr>
-          <p:nvPr>
-            <p:ph type="title"/>
-          </p:nvPr>
-        </p:nvSpPr>
-        <p:spPr/>
-        <p:txBody>
-          <a:bodyPr/>
-          <a:lstStyle/>
-          <a:p>
-            <a:r>
-              <a:rPr lang="pt-BR" dirty="0"/>
-              <a:t>Catálogo </a:t>
-            </a:r>
-          </a:p>
-        </p:txBody>
-      </p:sp>
-      <p:pic>
-        <p:nvPicPr>
-          <p:cNvPr id="5" name="Espaço Reservado para Conteúdo 4">
-            <a:extLst>
-              <a:ext uri="{FF2B5EF4-FFF2-40B4-BE49-F238E27FC236}">
-                <a16:creationId xmlns:a16="http://schemas.microsoft.com/office/drawing/2014/main" id="{B58E593A-1CBA-68D2-36EE-82FFDE837763}"/>
-              </a:ext>
-            </a:extLst>
-          </p:cNvPr>
-          <p:cNvPicPr>
-            <a:picLocks noGrp="1" noChangeAspect="1"/>
-          </p:cNvPicPr>
-          <p:nvPr>
-            <p:ph idx="1"/>
-          </p:nvPr>
-        </p:nvPicPr>
-        <p:blipFill>
-          <a:blip r:embed="rId2"/>
-          <a:stretch>
-            <a:fillRect/>
-          </a:stretch>
-        </p:blipFill>
-        <p:spPr>
-          <a:xfrm>
-            <a:off x="1887068" y="1846263"/>
-            <a:ext cx="8478190" cy="4022725"/>
-          </a:xfrm>
-        </p:spPr>
-      </p:pic>
-    </p:spTree>
-    <p:extLst>
-      <p:ext uri="{BB962C8B-B14F-4D97-AF65-F5344CB8AC3E}">
-        <p14:creationId xmlns:p14="http://schemas.microsoft.com/office/powerpoint/2010/main" val="2015076708"/>
-      </p:ext>
-    </p:extLst>
-  </p:cSld>
-  <p:clrMapOvr>
-    <a:masterClrMapping/>
-  </p:clrMapOvr>
-</p:sld>
-</file>
-
-<file path=ppt/slides/slide11.xml><?xml version="1.0" encoding="utf-8"?>
-<p:sld xmlns:a="http://schemas.openxmlformats.org/drawingml/2006/main" xmlns:r="http://schemas.openxmlformats.org/officeDocument/2006/relationships" xmlns:p="http://schemas.openxmlformats.org/presentationml/2006/main">
-  <p:cSld>
-    <p:spTree>
-      <p:nvGrpSpPr>
-        <p:cNvPr id="1" name=""/>
-        <p:cNvGrpSpPr/>
-        <p:nvPr/>
-      </p:nvGrpSpPr>
-      <p:grpSpPr>
-        <a:xfrm>
-          <a:off x="0" y="0"/>
-          <a:ext cx="0" cy="0"/>
-          <a:chOff x="0" y="0"/>
-          <a:chExt cx="0" cy="0"/>
-        </a:xfrm>
-      </p:grpSpPr>
-      <p:sp>
-        <p:nvSpPr>
-          <p:cNvPr id="2" name="Título 1">
-            <a:extLst>
-              <a:ext uri="{FF2B5EF4-FFF2-40B4-BE49-F238E27FC236}">
-                <a16:creationId xmlns:a16="http://schemas.microsoft.com/office/drawing/2014/main" id="{24F926CC-76FF-D074-1965-BF6AB286D40D}"/>
-              </a:ext>
-            </a:extLst>
-          </p:cNvPr>
-          <p:cNvSpPr>
-            <a:spLocks noGrp="1"/>
-          </p:cNvSpPr>
-          <p:nvPr>
-            <p:ph type="title"/>
-          </p:nvPr>
-        </p:nvSpPr>
-        <p:spPr/>
-        <p:txBody>
-          <a:bodyPr/>
-          <a:lstStyle/>
-          <a:p>
-            <a:r>
-              <a:rPr lang="pt-BR" dirty="0" err="1"/>
-              <a:t>Dataset</a:t>
-            </a:r>
-            <a:endParaRPr lang="pt-BR" dirty="0"/>
-          </a:p>
-        </p:txBody>
-      </p:sp>
-      <p:pic>
-        <p:nvPicPr>
-          <p:cNvPr id="5" name="Espaço Reservado para Conteúdo 4">
-            <a:extLst>
-              <a:ext uri="{FF2B5EF4-FFF2-40B4-BE49-F238E27FC236}">
-                <a16:creationId xmlns:a16="http://schemas.microsoft.com/office/drawing/2014/main" id="{0A496C5D-69FE-381A-0AA9-93E6CD5EF8C9}"/>
-              </a:ext>
-            </a:extLst>
-          </p:cNvPr>
-          <p:cNvPicPr>
-            <a:picLocks noGrp="1" noChangeAspect="1"/>
-          </p:cNvPicPr>
-          <p:nvPr>
-            <p:ph idx="1"/>
-          </p:nvPr>
-        </p:nvPicPr>
-        <p:blipFill>
-          <a:blip r:embed="rId3"/>
-          <a:stretch>
-            <a:fillRect/>
-          </a:stretch>
-        </p:blipFill>
-        <p:spPr>
-          <a:xfrm>
-            <a:off x="1887068" y="1846263"/>
-            <a:ext cx="8478190" cy="4022725"/>
-          </a:xfrm>
-        </p:spPr>
-      </p:pic>
-    </p:spTree>
-    <p:extLst>
-      <p:ext uri="{BB962C8B-B14F-4D97-AF65-F5344CB8AC3E}">
-        <p14:creationId xmlns:p14="http://schemas.microsoft.com/office/powerpoint/2010/main" val="4279367465"/>
-      </p:ext>
-    </p:extLst>
-  </p:cSld>
-  <p:clrMapOvr>
-    <a:masterClrMapping/>
-  </p:clrMapOvr>
-</p:sld>
-</file>
-
-<file path=ppt/slides/slide12.xml><?xml version="1.0" encoding="utf-8"?>
-<p:sld xmlns:a="http://schemas.openxmlformats.org/drawingml/2006/main" xmlns:r="http://schemas.openxmlformats.org/officeDocument/2006/relationships" xmlns:p="http://schemas.openxmlformats.org/presentationml/2006/main">
-  <p:cSld>
-    <p:spTree>
-      <p:nvGrpSpPr>
-        <p:cNvPr id="1" name=""/>
-        <p:cNvGrpSpPr/>
-        <p:nvPr/>
-      </p:nvGrpSpPr>
-      <p:grpSpPr>
-        <a:xfrm>
-          <a:off x="0" y="0"/>
-          <a:ext cx="0" cy="0"/>
-          <a:chOff x="0" y="0"/>
-          <a:chExt cx="0" cy="0"/>
-        </a:xfrm>
-      </p:grpSpPr>
-      <p:sp>
-        <p:nvSpPr>
-          <p:cNvPr id="2" name="Título 1">
-            <a:extLst>
-              <a:ext uri="{FF2B5EF4-FFF2-40B4-BE49-F238E27FC236}">
-                <a16:creationId xmlns:a16="http://schemas.microsoft.com/office/drawing/2014/main" id="{D81E90A0-66EE-1A18-5564-93E5F1829273}"/>
-              </a:ext>
-            </a:extLst>
-          </p:cNvPr>
-          <p:cNvSpPr>
-            <a:spLocks noGrp="1"/>
-          </p:cNvSpPr>
-          <p:nvPr>
-            <p:ph type="title"/>
-          </p:nvPr>
-        </p:nvSpPr>
-        <p:spPr/>
-        <p:txBody>
-          <a:bodyPr/>
-          <a:lstStyle/>
-          <a:p>
-            <a:r>
-              <a:rPr lang="pt-BR" dirty="0" err="1"/>
-              <a:t>Metabase</a:t>
-            </a:r>
-            <a:endParaRPr lang="pt-BR" dirty="0"/>
-          </a:p>
-        </p:txBody>
-      </p:sp>
-      <p:pic>
-        <p:nvPicPr>
-          <p:cNvPr id="5" name="Espaço Reservado para Conteúdo 4">
-            <a:extLst>
-              <a:ext uri="{FF2B5EF4-FFF2-40B4-BE49-F238E27FC236}">
-                <a16:creationId xmlns:a16="http://schemas.microsoft.com/office/drawing/2014/main" id="{5C711BD5-3033-92C3-B54A-5453954B7010}"/>
-              </a:ext>
-            </a:extLst>
-          </p:cNvPr>
-          <p:cNvPicPr>
-            <a:picLocks noGrp="1" noChangeAspect="1"/>
-          </p:cNvPicPr>
-          <p:nvPr>
-            <p:ph idx="1"/>
-          </p:nvPr>
-        </p:nvPicPr>
-        <p:blipFill>
-          <a:blip r:embed="rId3"/>
-          <a:stretch>
-            <a:fillRect/>
-          </a:stretch>
-        </p:blipFill>
-        <p:spPr>
-          <a:xfrm>
-            <a:off x="1887068" y="1846263"/>
-            <a:ext cx="8478190" cy="4022725"/>
-          </a:xfrm>
-        </p:spPr>
-      </p:pic>
-    </p:spTree>
-    <p:extLst>
-      <p:ext uri="{BB962C8B-B14F-4D97-AF65-F5344CB8AC3E}">
-        <p14:creationId xmlns:p14="http://schemas.microsoft.com/office/powerpoint/2010/main" val="2263661611"/>
-      </p:ext>
-    </p:extLst>
-  </p:cSld>
-  <p:clrMapOvr>
-    <a:masterClrMapping/>
-  </p:clrMapOvr>
-</p:sld>
-</file>
-
-<file path=ppt/slides/slide13.xml><?xml version="1.0" encoding="utf-8"?>
-<p:sld xmlns:a="http://schemas.openxmlformats.org/drawingml/2006/main" xmlns:r="http://schemas.openxmlformats.org/officeDocument/2006/relationships" xmlns:p="http://schemas.openxmlformats.org/presentationml/2006/main">
-  <p:cSld>
-    <p:spTree>
-      <p:nvGrpSpPr>
-        <p:cNvPr id="1" name=""/>
-        <p:cNvGrpSpPr/>
-        <p:nvPr/>
-      </p:nvGrpSpPr>
-      <p:grpSpPr>
-        <a:xfrm>
-          <a:off x="0" y="0"/>
-          <a:ext cx="0" cy="0"/>
-          <a:chOff x="0" y="0"/>
-          <a:chExt cx="0" cy="0"/>
-        </a:xfrm>
-      </p:grpSpPr>
-      <p:sp>
-        <p:nvSpPr>
-          <p:cNvPr id="2" name="Título 1">
-            <a:extLst>
-              <a:ext uri="{FF2B5EF4-FFF2-40B4-BE49-F238E27FC236}">
-                <a16:creationId xmlns:a16="http://schemas.microsoft.com/office/drawing/2014/main" id="{7068F4FE-C37A-68EC-8899-971AB979542C}"/>
-              </a:ext>
-            </a:extLst>
-          </p:cNvPr>
-          <p:cNvSpPr>
-            <a:spLocks noGrp="1"/>
-          </p:cNvSpPr>
-          <p:nvPr>
-            <p:ph type="title"/>
-          </p:nvPr>
-        </p:nvSpPr>
-        <p:spPr/>
-        <p:txBody>
-          <a:bodyPr/>
-          <a:lstStyle/>
-          <a:p>
-            <a:r>
-              <a:rPr lang="pt-BR" dirty="0"/>
-              <a:t>Dashboard</a:t>
-            </a:r>
-          </a:p>
-        </p:txBody>
-      </p:sp>
-      <p:pic>
-        <p:nvPicPr>
-          <p:cNvPr id="5" name="Espaço Reservado para Conteúdo 4">
-            <a:extLst>
-              <a:ext uri="{FF2B5EF4-FFF2-40B4-BE49-F238E27FC236}">
-                <a16:creationId xmlns:a16="http://schemas.microsoft.com/office/drawing/2014/main" id="{1AB5906D-AACA-C048-9298-B5EF8BE287E2}"/>
-              </a:ext>
-            </a:extLst>
-          </p:cNvPr>
-          <p:cNvPicPr>
-            <a:picLocks noGrp="1" noChangeAspect="1"/>
-          </p:cNvPicPr>
-          <p:nvPr>
-            <p:ph idx="1"/>
-          </p:nvPr>
-        </p:nvPicPr>
-        <p:blipFill>
-          <a:blip r:embed="rId3"/>
-          <a:stretch>
-            <a:fillRect/>
-          </a:stretch>
-        </p:blipFill>
-        <p:spPr>
-          <a:xfrm>
-            <a:off x="2550407" y="1846263"/>
-            <a:ext cx="7151511" cy="4022725"/>
-          </a:xfrm>
-        </p:spPr>
-      </p:pic>
-    </p:spTree>
-    <p:extLst>
-      <p:ext uri="{BB962C8B-B14F-4D97-AF65-F5344CB8AC3E}">
-        <p14:creationId xmlns:p14="http://schemas.microsoft.com/office/powerpoint/2010/main" val="2382617822"/>
-      </p:ext>
-    </p:extLst>
-  </p:cSld>
-  <p:clrMapOvr>
-    <a:masterClrMapping/>
-  </p:clrMapOvr>
-</p:sld>
-</file>
-
-<file path=ppt/slides/slide14.xml><?xml version="1.0" encoding="utf-8"?>
-<p:sld xmlns:a="http://schemas.openxmlformats.org/drawingml/2006/main" xmlns:r="http://schemas.openxmlformats.org/officeDocument/2006/relationships" xmlns:p="http://schemas.openxmlformats.org/presentationml/2006/main">
-  <p:cSld>
-    <p:spTree>
-      <p:nvGrpSpPr>
-        <p:cNvPr id="1" name=""/>
-        <p:cNvGrpSpPr/>
-        <p:nvPr/>
-      </p:nvGrpSpPr>
-      <p:grpSpPr>
-        <a:xfrm>
-          <a:off x="0" y="0"/>
-          <a:ext cx="0" cy="0"/>
-          <a:chOff x="0" y="0"/>
-          <a:chExt cx="0" cy="0"/>
-        </a:xfrm>
-      </p:grpSpPr>
-      <p:sp>
-        <p:nvSpPr>
-          <p:cNvPr id="4" name="Título 3">
-            <a:extLst>
-              <a:ext uri="{FF2B5EF4-FFF2-40B4-BE49-F238E27FC236}">
-                <a16:creationId xmlns:a16="http://schemas.microsoft.com/office/drawing/2014/main" id="{C94B1F81-228F-F5E4-71E9-4BD5B83C874D}"/>
-              </a:ext>
-            </a:extLst>
-          </p:cNvPr>
-          <p:cNvSpPr>
-            <a:spLocks noGrp="1"/>
-          </p:cNvSpPr>
-          <p:nvPr>
-            <p:ph type="title"/>
-          </p:nvPr>
-        </p:nvSpPr>
-        <p:spPr>
-          <a:xfrm>
-            <a:off x="1097280" y="758952"/>
-            <a:ext cx="10058400" cy="3566160"/>
-          </a:xfrm>
-        </p:spPr>
-        <p:txBody>
-          <a:bodyPr>
-            <a:normAutofit/>
-          </a:bodyPr>
-          <a:lstStyle/>
-          <a:p>
-            <a:r>
-              <a:rPr lang="pt-BR" dirty="0"/>
-              <a:t>Oportunidades e ganhos</a:t>
-            </a:r>
-          </a:p>
-        </p:txBody>
-      </p:sp>
-      <p:sp>
-        <p:nvSpPr>
-          <p:cNvPr id="3" name="Espaço Reservado para Texto 2">
-            <a:extLst>
-              <a:ext uri="{FF2B5EF4-FFF2-40B4-BE49-F238E27FC236}">
-                <a16:creationId xmlns:a16="http://schemas.microsoft.com/office/drawing/2014/main" id="{CEC3FB66-D259-232E-8DA5-36C15BB557CE}"/>
-              </a:ext>
-            </a:extLst>
-          </p:cNvPr>
-          <p:cNvSpPr>
-            <a:spLocks noGrp="1"/>
-          </p:cNvSpPr>
-          <p:nvPr>
-            <p:ph type="body" idx="1"/>
-          </p:nvPr>
-        </p:nvSpPr>
-        <p:spPr/>
-        <p:txBody>
-          <a:bodyPr/>
-          <a:lstStyle/>
-          <a:p>
-            <a:r>
-              <a:rPr lang="pt-BR" dirty="0"/>
-              <a:t>Oportunidades e ganhos futuros de se adotar a </a:t>
-            </a:r>
-            <a:r>
-              <a:rPr lang="pt-BR" dirty="0" err="1"/>
-              <a:t>Dadosfera</a:t>
-            </a:r>
-            <a:r>
-              <a:rPr lang="pt-BR" dirty="0"/>
-              <a:t>, frente à solução atual</a:t>
-            </a:r>
-          </a:p>
-        </p:txBody>
-      </p:sp>
-    </p:spTree>
-    <p:extLst>
-      <p:ext uri="{BB962C8B-B14F-4D97-AF65-F5344CB8AC3E}">
-        <p14:creationId xmlns:p14="http://schemas.microsoft.com/office/powerpoint/2010/main" val="1806253079"/>
-      </p:ext>
-    </p:extLst>
-  </p:cSld>
-  <p:clrMapOvr>
-    <a:masterClrMapping/>
-  </p:clrMapOvr>
-</p:sld>
-</file>
-
-<file path=ppt/slides/slide15.xml><?xml version="1.0" encoding="utf-8"?>
-<p:sld xmlns:a="http://schemas.openxmlformats.org/drawingml/2006/main" xmlns:r="http://schemas.openxmlformats.org/officeDocument/2006/relationships" xmlns:p="http://schemas.openxmlformats.org/presentationml/2006/main">
-  <p:cSld>
-    <p:spTree>
-      <p:nvGrpSpPr>
-        <p:cNvPr id="1" name=""/>
-        <p:cNvGrpSpPr/>
-        <p:nvPr/>
-      </p:nvGrpSpPr>
-      <p:grpSpPr>
-        <a:xfrm>
-          <a:off x="0" y="0"/>
-          <a:ext cx="0" cy="0"/>
-          <a:chOff x="0" y="0"/>
-          <a:chExt cx="0" cy="0"/>
-        </a:xfrm>
-      </p:grpSpPr>
-      <p:sp>
-        <p:nvSpPr>
-          <p:cNvPr id="2" name="Título 1">
-            <a:extLst>
-              <a:ext uri="{FF2B5EF4-FFF2-40B4-BE49-F238E27FC236}">
-                <a16:creationId xmlns:a16="http://schemas.microsoft.com/office/drawing/2014/main" id="{3C266FAC-162F-7309-CF0F-37FB5044BB0E}"/>
-              </a:ext>
-            </a:extLst>
-          </p:cNvPr>
-          <p:cNvSpPr>
-            <a:spLocks noGrp="1"/>
-          </p:cNvSpPr>
-          <p:nvPr>
-            <p:ph type="title"/>
-          </p:nvPr>
-        </p:nvSpPr>
-        <p:spPr/>
-        <p:txBody>
-          <a:bodyPr>
-            <a:normAutofit/>
-          </a:bodyPr>
-          <a:lstStyle/>
-          <a:p>
-            <a:r>
-              <a:rPr lang="pt-BR" dirty="0"/>
-              <a:t>Benefícios</a:t>
-            </a:r>
-          </a:p>
-        </p:txBody>
-      </p:sp>
-      <p:sp>
-        <p:nvSpPr>
-          <p:cNvPr id="3" name="Espaço Reservado para Conteúdo 2">
-            <a:extLst>
-              <a:ext uri="{FF2B5EF4-FFF2-40B4-BE49-F238E27FC236}">
-                <a16:creationId xmlns:a16="http://schemas.microsoft.com/office/drawing/2014/main" id="{EC750F40-593B-00F2-87B4-92A453F2E10D}"/>
-              </a:ext>
-            </a:extLst>
-          </p:cNvPr>
-          <p:cNvSpPr>
-            <a:spLocks noGrp="1"/>
-          </p:cNvSpPr>
-          <p:nvPr>
-            <p:ph idx="1"/>
-          </p:nvPr>
-        </p:nvSpPr>
-        <p:spPr/>
-        <p:txBody>
-          <a:bodyPr>
-            <a:normAutofit/>
-          </a:bodyPr>
-          <a:lstStyle/>
-          <a:p>
-            <a:r>
-              <a:rPr lang="pt-BR" dirty="0"/>
-              <a:t>Menor complexidade do pipeline de dados</a:t>
-            </a:r>
-          </a:p>
-          <a:p>
-            <a:r>
-              <a:rPr lang="pt-BR" dirty="0"/>
-              <a:t>Diminuição de custos </a:t>
-            </a:r>
-          </a:p>
-          <a:p>
-            <a:pPr lvl="1"/>
-            <a:r>
-              <a:rPr lang="pt-BR" dirty="0"/>
-              <a:t>Pessoal especializado</a:t>
-            </a:r>
-          </a:p>
-          <a:p>
-            <a:pPr lvl="1"/>
-            <a:r>
-              <a:rPr lang="pt-BR" dirty="0"/>
-              <a:t>Gestão de Infraestrutura </a:t>
-            </a:r>
-          </a:p>
-          <a:p>
-            <a:pPr lvl="1"/>
-            <a:r>
-              <a:rPr lang="pt-BR" dirty="0"/>
-              <a:t>Segurança</a:t>
-            </a:r>
-          </a:p>
-          <a:p>
-            <a:r>
-              <a:rPr lang="pt-BR" dirty="0"/>
-              <a:t>Facilitação da governança </a:t>
-            </a:r>
-          </a:p>
-          <a:p>
-            <a:r>
-              <a:rPr lang="pt-BR" dirty="0"/>
-              <a:t>Maior agilidade em todo o processo</a:t>
-            </a:r>
-          </a:p>
-          <a:p>
-            <a:r>
-              <a:rPr lang="pt-BR" dirty="0"/>
-              <a:t>Melhor retorno sobre o investimento</a:t>
-            </a:r>
-          </a:p>
-          <a:p>
-            <a:r>
-              <a:rPr lang="pt-BR" dirty="0"/>
-              <a:t>Melhor time ‘</a:t>
-            </a:r>
-            <a:r>
-              <a:rPr lang="pt-BR" dirty="0" err="1"/>
-              <a:t>to</a:t>
-            </a:r>
-            <a:r>
-              <a:rPr lang="pt-BR" dirty="0"/>
-              <a:t> </a:t>
-            </a:r>
-            <a:r>
-              <a:rPr lang="pt-BR" dirty="0" err="1"/>
-              <a:t>market</a:t>
-            </a:r>
-            <a:r>
-              <a:rPr lang="pt-BR" dirty="0"/>
-              <a:t>’</a:t>
-            </a:r>
-          </a:p>
-          <a:p>
-            <a:endParaRPr lang="pt-BR" dirty="0"/>
-          </a:p>
-        </p:txBody>
-      </p:sp>
-    </p:spTree>
-    <p:extLst>
-      <p:ext uri="{BB962C8B-B14F-4D97-AF65-F5344CB8AC3E}">
-        <p14:creationId xmlns:p14="http://schemas.microsoft.com/office/powerpoint/2010/main" val="2558941909"/>
-      </p:ext>
-    </p:extLst>
-  </p:cSld>
-  <p:clrMapOvr>
-    <a:masterClrMapping/>
-  </p:clrMapOvr>
-</p:sld>
-</file>
-
-<file path=ppt/slides/slide16.xml><?xml version="1.0" encoding="utf-8"?>
-<p:sld xmlns:a="http://schemas.openxmlformats.org/drawingml/2006/main" xmlns:r="http://schemas.openxmlformats.org/officeDocument/2006/relationships" xmlns:p="http://schemas.openxmlformats.org/presentationml/2006/main">
-  <p:cSld>
-    <p:spTree>
-      <p:nvGrpSpPr>
-        <p:cNvPr id="1" name=""/>
-        <p:cNvGrpSpPr/>
-        <p:nvPr/>
-      </p:nvGrpSpPr>
-      <p:grpSpPr>
-        <a:xfrm>
-          <a:off x="0" y="0"/>
-          <a:ext cx="0" cy="0"/>
-          <a:chOff x="0" y="0"/>
-          <a:chExt cx="0" cy="0"/>
-        </a:xfrm>
-      </p:grpSpPr>
-      <p:sp>
-        <p:nvSpPr>
-          <p:cNvPr id="2" name="Título 1">
-            <a:extLst>
-              <a:ext uri="{FF2B5EF4-FFF2-40B4-BE49-F238E27FC236}">
                 <a16:creationId xmlns:a16="http://schemas.microsoft.com/office/drawing/2014/main" id="{D477BC4E-65DE-2988-22AB-E9BFCD7F48EF}"/>
               </a:ext>
             </a:extLst>
@@ -14835,10 +14050,10 @@
       </p:grpSpPr>
       <p:sp>
         <p:nvSpPr>
-          <p:cNvPr id="2" name="Título 1">
+          <p:cNvPr id="4" name="Título 3">
             <a:extLst>
               <a:ext uri="{FF2B5EF4-FFF2-40B4-BE49-F238E27FC236}">
-                <a16:creationId xmlns:a16="http://schemas.microsoft.com/office/drawing/2014/main" id="{92FBF574-A78D-A9A5-BED6-612B02448D5A}"/>
+                <a16:creationId xmlns:a16="http://schemas.microsoft.com/office/drawing/2014/main" id="{C94B1F81-228F-F5E4-71E9-4BD5B83C874D}"/>
               </a:ext>
             </a:extLst>
           </p:cNvPr>
@@ -14849,6 +14064,41 @@
             <p:ph type="title"/>
           </p:nvPr>
         </p:nvSpPr>
+        <p:spPr>
+          <a:xfrm>
+            <a:off x="1097280" y="758952"/>
+            <a:ext cx="10058400" cy="3566160"/>
+          </a:xfrm>
+        </p:spPr>
+        <p:txBody>
+          <a:bodyPr>
+            <a:normAutofit/>
+          </a:bodyPr>
+          <a:lstStyle/>
+          <a:p>
+            <a:r>
+              <a:rPr lang="pt-BR" dirty="0"/>
+              <a:t>Oportunidades e ganhos</a:t>
+            </a:r>
+          </a:p>
+        </p:txBody>
+      </p:sp>
+      <p:sp>
+        <p:nvSpPr>
+          <p:cNvPr id="3" name="Espaço Reservado para Texto 2">
+            <a:extLst>
+              <a:ext uri="{FF2B5EF4-FFF2-40B4-BE49-F238E27FC236}">
+                <a16:creationId xmlns:a16="http://schemas.microsoft.com/office/drawing/2014/main" id="{CEC3FB66-D259-232E-8DA5-36C15BB557CE}"/>
+              </a:ext>
+            </a:extLst>
+          </p:cNvPr>
+          <p:cNvSpPr>
+            <a:spLocks noGrp="1"/>
+          </p:cNvSpPr>
+          <p:nvPr>
+            <p:ph type="body" idx="1"/>
+          </p:nvPr>
+        </p:nvSpPr>
         <p:spPr/>
         <p:txBody>
           <a:bodyPr/>
@@ -14856,44 +14106,23 @@
           <a:p>
             <a:r>
               <a:rPr lang="pt-BR" dirty="0"/>
-              <a:t>Importação</a:t>
+              <a:t>Oportunidades e ganhos futuros de se adotar a </a:t>
+            </a:r>
+            <a:r>
+              <a:rPr lang="pt-BR" dirty="0" err="1"/>
+              <a:t>Dadosfera</a:t>
+            </a:r>
+            <a:r>
+              <a:rPr lang="pt-BR" dirty="0"/>
+              <a:t>, frente à solução atual</a:t>
             </a:r>
           </a:p>
         </p:txBody>
       </p:sp>
-      <p:pic>
-        <p:nvPicPr>
-          <p:cNvPr id="5" name="Espaço Reservado para Conteúdo 4">
-            <a:extLst>
-              <a:ext uri="{FF2B5EF4-FFF2-40B4-BE49-F238E27FC236}">
-                <a16:creationId xmlns:a16="http://schemas.microsoft.com/office/drawing/2014/main" id="{AC037243-8800-8F72-572B-FF954B00B8D1}"/>
-              </a:ext>
-            </a:extLst>
-          </p:cNvPr>
-          <p:cNvPicPr>
-            <a:picLocks noGrp="1" noChangeAspect="1"/>
-          </p:cNvPicPr>
-          <p:nvPr>
-            <p:ph idx="1"/>
-          </p:nvPr>
-        </p:nvPicPr>
-        <p:blipFill>
-          <a:blip r:embed="rId2"/>
-          <a:stretch>
-            <a:fillRect/>
-          </a:stretch>
-        </p:blipFill>
-        <p:spPr>
-          <a:xfrm>
-            <a:off x="1887068" y="1846263"/>
-            <a:ext cx="8478190" cy="4022725"/>
-          </a:xfrm>
-        </p:spPr>
-      </p:pic>
     </p:spTree>
     <p:extLst>
       <p:ext uri="{BB962C8B-B14F-4D97-AF65-F5344CB8AC3E}">
-        <p14:creationId xmlns:p14="http://schemas.microsoft.com/office/powerpoint/2010/main" val="2622111293"/>
+        <p14:creationId xmlns:p14="http://schemas.microsoft.com/office/powerpoint/2010/main" val="1806253079"/>
       </p:ext>
     </p:extLst>
   </p:cSld>
@@ -14925,7 +14154,7 @@
           <p:cNvPr id="2" name="Título 1">
             <a:extLst>
               <a:ext uri="{FF2B5EF4-FFF2-40B4-BE49-F238E27FC236}">
-                <a16:creationId xmlns:a16="http://schemas.microsoft.com/office/drawing/2014/main" id="{61E72013-3EDC-7045-EECA-B1F60B55983B}"/>
+                <a16:creationId xmlns:a16="http://schemas.microsoft.com/office/drawing/2014/main" id="{3C266FAC-162F-7309-CF0F-37FB5044BB0E}"/>
               </a:ext>
             </a:extLst>
           </p:cNvPr>
@@ -14938,49 +14167,122 @@
         </p:nvSpPr>
         <p:spPr/>
         <p:txBody>
-          <a:bodyPr/>
+          <a:bodyPr>
+            <a:normAutofit/>
+          </a:bodyPr>
           <a:lstStyle/>
           <a:p>
             <a:r>
               <a:rPr lang="pt-BR" dirty="0"/>
-              <a:t>Carga</a:t>
+              <a:t>Benefícios</a:t>
             </a:r>
           </a:p>
         </p:txBody>
       </p:sp>
-      <p:pic>
-        <p:nvPicPr>
-          <p:cNvPr id="5" name="Espaço Reservado para Conteúdo 4">
+      <p:sp>
+        <p:nvSpPr>
+          <p:cNvPr id="3" name="Espaço Reservado para Conteúdo 2">
             <a:extLst>
               <a:ext uri="{FF2B5EF4-FFF2-40B4-BE49-F238E27FC236}">
-                <a16:creationId xmlns:a16="http://schemas.microsoft.com/office/drawing/2014/main" id="{78552161-AC0F-3256-1775-CC22BD61A274}"/>
+                <a16:creationId xmlns:a16="http://schemas.microsoft.com/office/drawing/2014/main" id="{EC750F40-593B-00F2-87B4-92A453F2E10D}"/>
               </a:ext>
             </a:extLst>
           </p:cNvPr>
-          <p:cNvPicPr>
-            <a:picLocks noGrp="1" noChangeAspect="1"/>
-          </p:cNvPicPr>
+          <p:cNvSpPr>
+            <a:spLocks noGrp="1"/>
+          </p:cNvSpPr>
           <p:nvPr>
             <p:ph idx="1"/>
           </p:nvPr>
-        </p:nvPicPr>
-        <p:blipFill>
-          <a:blip r:embed="rId2"/>
-          <a:stretch>
-            <a:fillRect/>
-          </a:stretch>
-        </p:blipFill>
-        <p:spPr>
-          <a:xfrm>
-            <a:off x="1887068" y="1846263"/>
-            <a:ext cx="8478190" cy="4022725"/>
-          </a:xfrm>
-        </p:spPr>
-      </p:pic>
+        </p:nvSpPr>
+        <p:spPr/>
+        <p:txBody>
+          <a:bodyPr>
+            <a:normAutofit/>
+          </a:bodyPr>
+          <a:lstStyle/>
+          <a:p>
+            <a:r>
+              <a:rPr lang="pt-BR" dirty="0"/>
+              <a:t>Menor complexidade do pipeline de dados</a:t>
+            </a:r>
+          </a:p>
+          <a:p>
+            <a:r>
+              <a:rPr lang="pt-BR" dirty="0"/>
+              <a:t>Diminuição de custos </a:t>
+            </a:r>
+          </a:p>
+          <a:p>
+            <a:pPr lvl="1"/>
+            <a:r>
+              <a:rPr lang="pt-BR" dirty="0"/>
+              <a:t>Pessoal especializado</a:t>
+            </a:r>
+          </a:p>
+          <a:p>
+            <a:pPr lvl="1"/>
+            <a:r>
+              <a:rPr lang="pt-BR" dirty="0"/>
+              <a:t>Gestão de Infraestrutura </a:t>
+            </a:r>
+          </a:p>
+          <a:p>
+            <a:pPr lvl="1"/>
+            <a:r>
+              <a:rPr lang="pt-BR" dirty="0"/>
+              <a:t>Segurança</a:t>
+            </a:r>
+          </a:p>
+          <a:p>
+            <a:r>
+              <a:rPr lang="pt-BR" dirty="0"/>
+              <a:t>Facilitação da governança </a:t>
+            </a:r>
+          </a:p>
+          <a:p>
+            <a:r>
+              <a:rPr lang="pt-BR" dirty="0"/>
+              <a:t>Maior agilidade em todo o processo</a:t>
+            </a:r>
+          </a:p>
+          <a:p>
+            <a:r>
+              <a:rPr lang="pt-BR" dirty="0"/>
+              <a:t>Melhor retorno sobre o investimento</a:t>
+            </a:r>
+          </a:p>
+          <a:p>
+            <a:r>
+              <a:rPr lang="pt-BR" dirty="0"/>
+              <a:t>Melhor time ‘</a:t>
+            </a:r>
+            <a:r>
+              <a:rPr lang="pt-BR" dirty="0" err="1"/>
+              <a:t>to</a:t>
+            </a:r>
+            <a:r>
+              <a:rPr lang="pt-BR" dirty="0"/>
+              <a:t> </a:t>
+            </a:r>
+            <a:r>
+              <a:rPr lang="pt-BR" dirty="0" err="1"/>
+              <a:t>market</a:t>
+            </a:r>
+            <a:r>
+              <a:rPr lang="pt-BR" dirty="0"/>
+              <a:t>’</a:t>
+            </a:r>
+          </a:p>
+          <a:p>
+            <a:endParaRPr lang="pt-BR" dirty="0"/>
+          </a:p>
+        </p:txBody>
+      </p:sp>
     </p:spTree>
     <p:extLst>
       <p:ext uri="{BB962C8B-B14F-4D97-AF65-F5344CB8AC3E}">
-        <p14:creationId xmlns:p14="http://schemas.microsoft.com/office/powerpoint/2010/main" val="2006235323"/>
+        <p14:creationId xmlns:p14="http://schemas.microsoft.com/office/powerpoint/2010/main" val="2558941909"/>
       </p:ext>
     </p:extLst>
   </p:cSld>

</xml_diff>